<commit_message>
- Week 4 Lecture 1
</commit_message>
<xml_diff>
--- a/lectures/week4/lecture1/slides/week4_lecture1.pptx
+++ b/lectures/week4/lecture1/slides/week4_lecture1.pptx
@@ -82,8 +82,9 @@
     <p:sldId id="266" r:id="rId76"/>
     <p:sldId id="333" r:id="rId77"/>
     <p:sldId id="341" r:id="rId78"/>
-    <p:sldId id="324" r:id="rId79"/>
-    <p:sldId id="260" r:id="rId80"/>
+    <p:sldId id="408" r:id="rId79"/>
+    <p:sldId id="324" r:id="rId80"/>
+    <p:sldId id="409" r:id="rId81"/>
   </p:sldIdLst>
   <p:sldSz cx="12192000" cy="6858000"/>
   <p:notesSz cx="6858000" cy="9144000"/>
@@ -23913,10 +23914,10 @@
       </p:sp>
       <p:pic>
         <p:nvPicPr>
-          <p:cNvPr id="1028" name="Picture 4" descr="Toronto Maple Leafs Logo SVG, Maple Leafs Logo PNG, Toronto Maple Leaf  Symbol, TML Logo, Maple Logo">
-            <a:extLst>
-              <a:ext uri="{FF2B5EF4-FFF2-40B4-BE49-F238E27FC236}">
-                <a16:creationId xmlns:a16="http://schemas.microsoft.com/office/drawing/2014/main" id="{2A455DE7-3854-80B9-A9FE-9C31C13C1CF8}"/>
+          <p:cNvPr id="1030" name="Picture 6" descr="Ben K.">
+            <a:extLst>
+              <a:ext uri="{FF2B5EF4-FFF2-40B4-BE49-F238E27FC236}">
+                <a16:creationId xmlns:a16="http://schemas.microsoft.com/office/drawing/2014/main" id="{0CB80532-DD76-1DCA-B67A-1446C0DD2F73}"/>
               </a:ext>
             </a:extLst>
           </p:cNvPr>
@@ -23940,8 +23941,125 @@
         </p:blipFill>
         <p:spPr bwMode="auto">
           <a:xfrm>
-            <a:off x="8595726" y="90110"/>
-            <a:ext cx="2463044" cy="2463044"/>
+            <a:off x="7899809" y="505859"/>
+            <a:ext cx="2099184" cy="2099184"/>
+          </a:xfrm>
+          <a:prstGeom prst="ellipse">
+            <a:avLst/>
+          </a:prstGeom>
+          <a:ln w="76200" cap="rnd">
+            <a:solidFill>
+              <a:srgbClr val="00205B"/>
+            </a:solidFill>
+          </a:ln>
+          <a:effectLst>
+            <a:outerShdw blurRad="381000" dist="292100" dir="5400000" sx="-80000" sy="-18000" rotWithShape="0">
+              <a:srgbClr val="000000">
+                <a:alpha val="22000"/>
+              </a:srgbClr>
+            </a:outerShdw>
+          </a:effectLst>
+          <a:scene3d>
+            <a:camera prst="orthographicFront"/>
+            <a:lightRig rig="contrasting" dir="t">
+              <a:rot lat="0" lon="0" rev="3000000"/>
+            </a:lightRig>
+          </a:scene3d>
+          <a:sp3d contourW="7620">
+            <a:bevelT w="95250" h="31750"/>
+            <a:contourClr>
+              <a:srgbClr val="333333"/>
+            </a:contourClr>
+          </a:sp3d>
+          <a:extLst>
+            <a:ext uri="{909E8E84-426E-40DD-AFC4-6F175D3DCCD1}">
+              <a14:hiddenFill xmlns:a14="http://schemas.microsoft.com/office/drawing/2010/main">
+                <a:solidFill>
+                  <a:srgbClr val="FFFFFF"/>
+                </a:solidFill>
+              </a14:hiddenFill>
+            </a:ext>
+          </a:extLst>
+        </p:spPr>
+      </p:pic>
+      <p:pic>
+        <p:nvPicPr>
+          <p:cNvPr id="1028" name="Picture 4" descr="Toronto Maple Leafs Logo SVG, Maple Leafs Logo PNG, Toronto Maple Leaf  Symbol, TML Logo, Maple Logo">
+            <a:extLst>
+              <a:ext uri="{FF2B5EF4-FFF2-40B4-BE49-F238E27FC236}">
+                <a16:creationId xmlns:a16="http://schemas.microsoft.com/office/drawing/2014/main" id="{2A455DE7-3854-80B9-A9FE-9C31C13C1CF8}"/>
+              </a:ext>
+            </a:extLst>
+          </p:cNvPr>
+          <p:cNvPicPr>
+            <a:picLocks noChangeAspect="1" noChangeArrowheads="1"/>
+          </p:cNvPicPr>
+          <p:nvPr/>
+        </p:nvPicPr>
+        <p:blipFill>
+          <a:blip r:embed="rId3">
+            <a:extLst>
+              <a:ext uri="{28A0092B-C50C-407E-A947-70E740481C1C}">
+                <a14:useLocalDpi xmlns:a14="http://schemas.microsoft.com/office/drawing/2010/main" val="0"/>
+              </a:ext>
+            </a:extLst>
+          </a:blip>
+          <a:srcRect/>
+          <a:stretch>
+            <a:fillRect/>
+          </a:stretch>
+        </p:blipFill>
+        <p:spPr bwMode="auto">
+          <a:xfrm>
+            <a:off x="9570126" y="456790"/>
+            <a:ext cx="2197321" cy="2197321"/>
+          </a:xfrm>
+          <a:prstGeom prst="rect">
+            <a:avLst/>
+          </a:prstGeom>
+          <a:noFill/>
+          <a:extLst>
+            <a:ext uri="{909E8E84-426E-40DD-AFC4-6F175D3DCCD1}">
+              <a14:hiddenFill xmlns:a14="http://schemas.microsoft.com/office/drawing/2010/main">
+                <a:solidFill>
+                  <a:srgbClr val="FFFFFF"/>
+                </a:solidFill>
+              </a14:hiddenFill>
+            </a:ext>
+          </a:extLst>
+        </p:spPr>
+      </p:pic>
+      <p:pic>
+        <p:nvPicPr>
+          <p:cNvPr id="1032" name="Picture 8" descr="Red Heart Symbol on Transparent Background 18868329 PNG">
+            <a:extLst>
+              <a:ext uri="{FF2B5EF4-FFF2-40B4-BE49-F238E27FC236}">
+                <a16:creationId xmlns:a16="http://schemas.microsoft.com/office/drawing/2014/main" id="{56624131-83FD-A56C-E12A-AEB4258C462C}"/>
+              </a:ext>
+            </a:extLst>
+          </p:cNvPr>
+          <p:cNvPicPr>
+            <a:picLocks noChangeAspect="1" noChangeArrowheads="1"/>
+          </p:cNvPicPr>
+          <p:nvPr/>
+        </p:nvPicPr>
+        <p:blipFill>
+          <a:blip r:embed="rId4">
+            <a:extLst>
+              <a:ext uri="{28A0092B-C50C-407E-A947-70E740481C1C}">
+                <a14:useLocalDpi xmlns:a14="http://schemas.microsoft.com/office/drawing/2010/main" val="0"/>
+              </a:ext>
+            </a:extLst>
+          </a:blip>
+          <a:srcRect/>
+          <a:stretch>
+            <a:fillRect/>
+          </a:stretch>
+        </p:blipFill>
+        <p:spPr bwMode="auto">
+          <a:xfrm>
+            <a:off x="9421633" y="1465307"/>
+            <a:ext cx="808892" cy="808892"/>
           </a:xfrm>
           <a:prstGeom prst="rect">
             <a:avLst/>
@@ -53428,7 +53546,13 @@
   <p:cSld>
     <p:spTree>
       <p:nvGrpSpPr>
-        <p:cNvPr id="1" name=""/>
+        <p:cNvPr id="1" name="">
+          <a:extLst>
+            <a:ext uri="{FF2B5EF4-FFF2-40B4-BE49-F238E27FC236}">
+              <a16:creationId xmlns:a16="http://schemas.microsoft.com/office/drawing/2014/main" id="{E292EEF2-7F5F-A4DD-B31F-831F27BE6E9E}"/>
+            </a:ext>
+          </a:extLst>
+        </p:cNvPr>
         <p:cNvGrpSpPr/>
         <p:nvPr/>
       </p:nvGrpSpPr>
@@ -53442,10 +53566,10 @@
       </p:grpSpPr>
       <p:sp>
         <p:nvSpPr>
-          <p:cNvPr id="4" name="Title 3">
-            <a:extLst>
-              <a:ext uri="{FF2B5EF4-FFF2-40B4-BE49-F238E27FC236}">
-                <a16:creationId xmlns:a16="http://schemas.microsoft.com/office/drawing/2014/main" id="{0C118C3C-13F5-4EA8-9EA9-3448AC35375E}"/>
+          <p:cNvPr id="2" name="Title 1">
+            <a:extLst>
+              <a:ext uri="{FF2B5EF4-FFF2-40B4-BE49-F238E27FC236}">
+                <a16:creationId xmlns:a16="http://schemas.microsoft.com/office/drawing/2014/main" id="{7B00F26B-83F7-DF21-27CB-0D5A00C1281B}"/>
               </a:ext>
             </a:extLst>
           </p:cNvPr>
@@ -53464,18 +53588,26 @@
           <a:lstStyle/>
           <a:p>
             <a:r>
+              <a:rPr lang="en-US" b="1" dirty="0">
+                <a:solidFill>
+                  <a:schemeClr val="accent6"/>
+                </a:solidFill>
+              </a:rPr>
+              <a:t>Breakout Session </a:t>
+            </a:r>
+            <a:r>
               <a:rPr lang="en-US" b="1" dirty="0"/>
-              <a:t>Lecture Recap</a:t>
-            </a:r>
-          </a:p>
-        </p:txBody>
-      </p:sp>
-      <p:sp>
-        <p:nvSpPr>
-          <p:cNvPr id="5" name="Content Placeholder 4">
-            <a:extLst>
-              <a:ext uri="{FF2B5EF4-FFF2-40B4-BE49-F238E27FC236}">
-                <a16:creationId xmlns:a16="http://schemas.microsoft.com/office/drawing/2014/main" id="{85F37492-86E3-47CA-8641-D7457D28B946}"/>
+              <a:t>2</a:t>
+            </a:r>
+          </a:p>
+        </p:txBody>
+      </p:sp>
+      <p:sp>
+        <p:nvSpPr>
+          <p:cNvPr id="3" name="Content Placeholder 2">
+            <a:extLst>
+              <a:ext uri="{FF2B5EF4-FFF2-40B4-BE49-F238E27FC236}">
+                <a16:creationId xmlns:a16="http://schemas.microsoft.com/office/drawing/2014/main" id="{09C1B931-37BC-A6FE-ABF5-404AC665CC05}"/>
               </a:ext>
             </a:extLst>
           </p:cNvPr>
@@ -53488,8 +53620,8 @@
         </p:nvSpPr>
         <p:spPr>
           <a:xfrm>
-            <a:off x="838199" y="1825624"/>
-            <a:ext cx="11073063" cy="4835479"/>
+            <a:off x="838201" y="1825624"/>
+            <a:ext cx="6657474" cy="4900029"/>
           </a:xfrm>
         </p:spPr>
         <p:txBody>
@@ -53499,181 +53631,169 @@
           <a:lstStyle/>
           <a:p>
             <a:r>
-              <a:rPr lang="en-US" sz="3600" dirty="0"/>
-              <a:t>Looping </a:t>
-            </a:r>
-            <a:r>
-              <a:rPr lang="en-US" sz="3600" dirty="0">
+              <a:rPr lang="en-US" sz="3200" dirty="0"/>
+              <a:t>Write a function that roles a 6-sided dice until a lucky number is rolled</a:t>
+            </a:r>
+            <a:r>
+              <a:rPr lang="en-US" sz="3200" dirty="0">
+                <a:solidFill>
+                  <a:schemeClr val="accent2"/>
+                </a:solidFill>
+              </a:rPr>
+              <a:t>.</a:t>
+            </a:r>
+            <a:endParaRPr lang="en-US" sz="2800" dirty="0">
+              <a:solidFill>
+                <a:schemeClr val="accent2"/>
+              </a:solidFill>
+            </a:endParaRPr>
+          </a:p>
+        </p:txBody>
+      </p:sp>
+      <p:sp>
+        <p:nvSpPr>
+          <p:cNvPr id="11" name="Rectangle: Rounded Corners 10">
+            <a:extLst>
+              <a:ext uri="{FF2B5EF4-FFF2-40B4-BE49-F238E27FC236}">
+                <a16:creationId xmlns:a16="http://schemas.microsoft.com/office/drawing/2014/main" id="{3B0EC03C-EFB7-9326-110B-3CB39040DD33}"/>
+              </a:ext>
+            </a:extLst>
+          </p:cNvPr>
+          <p:cNvSpPr/>
+          <p:nvPr/>
+        </p:nvSpPr>
+        <p:spPr>
+          <a:xfrm>
+            <a:off x="7844590" y="1949006"/>
+            <a:ext cx="3958389" cy="4418765"/>
+          </a:xfrm>
+          <a:prstGeom prst="roundRect">
+            <a:avLst/>
+          </a:prstGeom>
+          <a:noFill/>
+          <a:ln w="76200">
+            <a:solidFill>
+              <a:schemeClr val="accent2"/>
+            </a:solidFill>
+          </a:ln>
+        </p:spPr>
+        <p:style>
+          <a:lnRef idx="2">
+            <a:schemeClr val="accent1">
+              <a:shade val="50000"/>
+            </a:schemeClr>
+          </a:lnRef>
+          <a:fillRef idx="1">
+            <a:schemeClr val="accent1"/>
+          </a:fillRef>
+          <a:effectRef idx="0">
+            <a:schemeClr val="accent1"/>
+          </a:effectRef>
+          <a:fontRef idx="minor">
+            <a:schemeClr val="lt1"/>
+          </a:fontRef>
+        </p:style>
+        <p:txBody>
+          <a:bodyPr rtlCol="0" anchor="ctr"/>
+          <a:lstStyle/>
+          <a:p>
+            <a:r>
+              <a:rPr lang="en-US" sz="4400" b="1" dirty="0">
+                <a:solidFill>
+                  <a:srgbClr val="FFFFFF"/>
+                </a:solidFill>
+              </a:rPr>
+              <a:t>Open your notebook</a:t>
+            </a:r>
+          </a:p>
+          <a:p>
+            <a:endParaRPr lang="en-US" sz="4400" b="1" dirty="0">
+              <a:solidFill>
+                <a:srgbClr val="FFFFFF"/>
+              </a:solidFill>
+            </a:endParaRPr>
+          </a:p>
+          <a:p>
+            <a:r>
+              <a:rPr lang="en-US" sz="2800" b="1" dirty="0">
+                <a:solidFill>
+                  <a:srgbClr val="FFFFFF"/>
+                </a:solidFill>
+              </a:rPr>
+              <a:t>Click Link</a:t>
+            </a:r>
+            <a:r>
+              <a:rPr lang="en-US" sz="2800" b="1" dirty="0">
                 <a:solidFill>
                   <a:schemeClr val="accent6"/>
                 </a:solidFill>
               </a:rPr>
-              <a:t>(</a:t>
-            </a:r>
-            <a:r>
-              <a:rPr lang="en-US" sz="3600" dirty="0"/>
-              <a:t>aka iteration</a:t>
-            </a:r>
-            <a:r>
-              <a:rPr lang="en-US" sz="3600" dirty="0">
+              <a:t>:</a:t>
+            </a:r>
+          </a:p>
+          <a:p>
+            <a:r>
+              <a:rPr lang="en-US" sz="2400" b="1" dirty="0">
                 <a:solidFill>
                   <a:schemeClr val="accent6"/>
                 </a:solidFill>
               </a:rPr>
-              <a:t>)</a:t>
-            </a:r>
-            <a:r>
-              <a:rPr lang="en-US" sz="3600" dirty="0"/>
-              <a:t> is the second key control structure in programming </a:t>
-            </a:r>
-            <a:r>
-              <a:rPr lang="en-US" sz="3600" dirty="0">
-                <a:solidFill>
-                  <a:schemeClr val="accent6"/>
-                </a:solidFill>
-              </a:rPr>
-              <a:t>(</a:t>
-            </a:r>
-            <a:r>
-              <a:rPr lang="en-US" sz="3600" dirty="0"/>
-              <a:t>if</a:t>
-            </a:r>
-            <a:r>
-              <a:rPr lang="en-US" sz="3600" dirty="0">
-                <a:solidFill>
-                  <a:schemeClr val="accent2"/>
-                </a:solidFill>
-              </a:rPr>
-              <a:t>-</a:t>
-            </a:r>
-            <a:r>
-              <a:rPr lang="en-US" sz="3600" dirty="0"/>
-              <a:t>statements</a:t>
-            </a:r>
-            <a:r>
-              <a:rPr lang="en-US" sz="3600" dirty="0">
-                <a:solidFill>
-                  <a:schemeClr val="accent2"/>
-                </a:solidFill>
-              </a:rPr>
-              <a:t>/</a:t>
-            </a:r>
-            <a:r>
-              <a:rPr lang="en-US" sz="3600" dirty="0"/>
-              <a:t>branching was the first</a:t>
-            </a:r>
-            <a:r>
-              <a:rPr lang="en-US" sz="3600" dirty="0">
-                <a:solidFill>
-                  <a:schemeClr val="accent6"/>
-                </a:solidFill>
-              </a:rPr>
-              <a:t>)</a:t>
-            </a:r>
-            <a:r>
-              <a:rPr lang="en-US" sz="3600" dirty="0">
-                <a:solidFill>
-                  <a:schemeClr val="accent2"/>
-                </a:solidFill>
-              </a:rPr>
-              <a:t>.</a:t>
-            </a:r>
-          </a:p>
-          <a:p>
-            <a:r>
-              <a:rPr lang="en-US" sz="3600" dirty="0"/>
-              <a:t>The basic idea of loops is to repeated execute the same block code</a:t>
-            </a:r>
-            <a:r>
-              <a:rPr lang="en-US" sz="3600" dirty="0">
-                <a:solidFill>
-                  <a:schemeClr val="accent2"/>
-                </a:solidFill>
-              </a:rPr>
-              <a:t>.</a:t>
-            </a:r>
-          </a:p>
-          <a:p>
-            <a:r>
-              <a:rPr lang="en-US" sz="3600" dirty="0"/>
-              <a:t>Looping is very powerful idea</a:t>
-            </a:r>
-            <a:r>
-              <a:rPr lang="en-US" sz="3600" dirty="0">
-                <a:solidFill>
-                  <a:schemeClr val="accent2"/>
-                </a:solidFill>
-              </a:rPr>
-              <a:t>.</a:t>
-            </a:r>
-          </a:p>
-          <a:p>
-            <a:r>
-              <a:rPr lang="en-US" sz="3600" dirty="0"/>
-              <a:t>While loops is one of two loop types in Python</a:t>
-            </a:r>
-            <a:r>
-              <a:rPr lang="en-US" sz="3600" dirty="0">
-                <a:solidFill>
-                  <a:schemeClr val="accent2"/>
-                </a:solidFill>
-              </a:rPr>
-              <a:t>.</a:t>
-            </a:r>
-          </a:p>
-        </p:txBody>
-      </p:sp>
-      <p:sp>
-        <p:nvSpPr>
-          <p:cNvPr id="6" name="TextBox 5">
-            <a:extLst>
-              <a:ext uri="{FF2B5EF4-FFF2-40B4-BE49-F238E27FC236}">
-                <a16:creationId xmlns:a16="http://schemas.microsoft.com/office/drawing/2014/main" id="{51EFBA85-7420-448C-A7B1-F6D46D6A491D}"/>
-              </a:ext>
-            </a:extLst>
-          </p:cNvPr>
-          <p:cNvSpPr txBox="1"/>
-          <p:nvPr/>
-        </p:nvSpPr>
-        <p:spPr>
-          <a:xfrm>
-            <a:off x="9546576" y="775642"/>
-            <a:ext cx="2265364" cy="707886"/>
+              <a:t>12. Breakout Session 2</a:t>
+            </a:r>
+          </a:p>
+        </p:txBody>
+      </p:sp>
+      <p:pic>
+        <p:nvPicPr>
+          <p:cNvPr id="2050" name="Picture 2" descr="Dice PNG, Dice Transparent Background - FreeIconsPNG">
+            <a:extLst>
+              <a:ext uri="{FF2B5EF4-FFF2-40B4-BE49-F238E27FC236}">
+                <a16:creationId xmlns:a16="http://schemas.microsoft.com/office/drawing/2014/main" id="{5636AF83-8B6B-218D-AC73-48B2E07AE9DB}"/>
+              </a:ext>
+            </a:extLst>
+          </p:cNvPr>
+          <p:cNvPicPr>
+            <a:picLocks noChangeAspect="1" noChangeArrowheads="1"/>
+          </p:cNvPicPr>
+          <p:nvPr/>
+        </p:nvPicPr>
+        <p:blipFill>
+          <a:blip r:embed="rId2">
+            <a:extLst>
+              <a:ext uri="{28A0092B-C50C-407E-A947-70E740481C1C}">
+                <a14:useLocalDpi xmlns:a14="http://schemas.microsoft.com/office/drawing/2010/main" val="0"/>
+              </a:ext>
+            </a:extLst>
+          </a:blip>
+          <a:srcRect/>
+          <a:stretch>
+            <a:fillRect/>
+          </a:stretch>
+        </p:blipFill>
+        <p:spPr bwMode="auto">
+          <a:xfrm>
+            <a:off x="2141414" y="3830484"/>
+            <a:ext cx="4149969" cy="2412169"/>
           </a:xfrm>
           <a:prstGeom prst="rect">
             <a:avLst/>
           </a:prstGeom>
           <a:noFill/>
-        </p:spPr>
-        <p:txBody>
-          <a:bodyPr wrap="none" rtlCol="0">
-            <a:spAutoFit/>
-          </a:bodyPr>
-          <a:lstStyle/>
-          <a:p>
-            <a:r>
-              <a:rPr lang="en-US" sz="4000" b="1" dirty="0">
-                <a:solidFill>
-                  <a:schemeClr val="accent6"/>
-                </a:solidFill>
-              </a:rPr>
-              <a:t>Practice</a:t>
-            </a:r>
-            <a:r>
-              <a:rPr lang="en-US" sz="4000" b="1" dirty="0">
-                <a:solidFill>
-                  <a:schemeClr val="accent1"/>
-                </a:solidFill>
-              </a:rPr>
-              <a:t>!</a:t>
-            </a:r>
-          </a:p>
-        </p:txBody>
-      </p:sp>
+          <a:extLst>
+            <a:ext uri="{909E8E84-426E-40DD-AFC4-6F175D3DCCD1}">
+              <a14:hiddenFill xmlns:a14="http://schemas.microsoft.com/office/drawing/2010/main">
+                <a:solidFill>
+                  <a:srgbClr val="FFFFFF"/>
+                </a:solidFill>
+              </a14:hiddenFill>
+            </a:ext>
+          </a:extLst>
+        </p:spPr>
+      </p:pic>
     </p:spTree>
     <p:extLst>
       <p:ext uri="{BB962C8B-B14F-4D97-AF65-F5344CB8AC3E}">
-        <p14:creationId xmlns:p14="http://schemas.microsoft.com/office/powerpoint/2010/main" val="577522275"/>
+        <p14:creationId xmlns:p14="http://schemas.microsoft.com/office/powerpoint/2010/main" val="791310692"/>
       </p:ext>
     </p:extLst>
   </p:cSld>
@@ -53702,10 +53822,10 @@
       </p:grpSpPr>
       <p:sp>
         <p:nvSpPr>
-          <p:cNvPr id="2" name="Title 1">
-            <a:extLst>
-              <a:ext uri="{FF2B5EF4-FFF2-40B4-BE49-F238E27FC236}">
-                <a16:creationId xmlns:a16="http://schemas.microsoft.com/office/drawing/2014/main" id="{057F06F2-AC3E-484E-9926-59D4F59092CE}"/>
+          <p:cNvPr id="4" name="Title 3">
+            <a:extLst>
+              <a:ext uri="{FF2B5EF4-FFF2-40B4-BE49-F238E27FC236}">
+                <a16:creationId xmlns:a16="http://schemas.microsoft.com/office/drawing/2014/main" id="{0C118C3C-13F5-4EA8-9EA9-3448AC35375E}"/>
               </a:ext>
             </a:extLst>
           </p:cNvPr>
@@ -53713,159 +53833,33 @@
             <a:spLocks noGrp="1"/>
           </p:cNvSpPr>
           <p:nvPr>
-            <p:ph type="ctrTitle"/>
+            <p:ph type="title"/>
           </p:nvPr>
         </p:nvSpPr>
-        <p:spPr/>
+        <p:spPr>
+          <a:xfrm>
+            <a:off x="2079869" y="2586087"/>
+            <a:ext cx="8032262" cy="1685825"/>
+          </a:xfrm>
+        </p:spPr>
         <p:txBody>
           <a:bodyPr>
-            <a:normAutofit fontScale="90000"/>
+            <a:noAutofit/>
           </a:bodyPr>
           <a:lstStyle/>
           <a:p>
-            <a:r>
-              <a:rPr lang="en-US" dirty="0"/>
-              <a:t>functions</a:t>
-            </a:r>
-            <a:r>
-              <a:rPr lang="en-US" dirty="0">
-                <a:solidFill>
-                  <a:schemeClr val="accent2"/>
-                </a:solidFill>
-              </a:rPr>
-              <a:t>,</a:t>
-            </a:r>
-            <a:r>
-              <a:rPr lang="en-US" dirty="0"/>
-              <a:t> input </a:t>
-            </a:r>
-            <a:r>
-              <a:rPr lang="en-US" dirty="0">
-                <a:solidFill>
-                  <a:schemeClr val="accent6"/>
-                </a:solidFill>
-              </a:rPr>
-              <a:t>&amp;</a:t>
-            </a:r>
-            <a:r>
-              <a:rPr lang="en-US" dirty="0"/>
-              <a:t> output</a:t>
-            </a:r>
-            <a:r>
-              <a:rPr lang="en-US" dirty="0">
-                <a:solidFill>
-                  <a:schemeClr val="accent2"/>
-                </a:solidFill>
-              </a:rPr>
-              <a:t>,</a:t>
-            </a:r>
-            <a:r>
-              <a:rPr lang="en-US" dirty="0"/>
-              <a:t> importing modules</a:t>
-            </a:r>
-            <a:r>
-              <a:rPr lang="en-US" dirty="0">
-                <a:solidFill>
-                  <a:schemeClr val="accent1"/>
-                </a:solidFill>
-              </a:rPr>
-              <a:t>.</a:t>
-            </a:r>
-          </a:p>
-        </p:txBody>
-      </p:sp>
-      <p:sp>
-        <p:nvSpPr>
-          <p:cNvPr id="3" name="Subtitle 2">
-            <a:extLst>
-              <a:ext uri="{FF2B5EF4-FFF2-40B4-BE49-F238E27FC236}">
-                <a16:creationId xmlns:a16="http://schemas.microsoft.com/office/drawing/2014/main" id="{99B07687-F068-40FC-84A1-E7860490CACD}"/>
-              </a:ext>
-            </a:extLst>
-          </p:cNvPr>
-          <p:cNvSpPr>
-            <a:spLocks noGrp="1"/>
-          </p:cNvSpPr>
-          <p:nvPr>
-            <p:ph type="subTitle" idx="1"/>
-          </p:nvPr>
-        </p:nvSpPr>
-        <p:spPr/>
-        <p:txBody>
-          <a:bodyPr/>
-          <a:lstStyle/>
-          <a:p>
-            <a:r>
-              <a:rPr lang="en-US" b="1" dirty="0"/>
-              <a:t>Week </a:t>
-            </a:r>
-            <a:r>
-              <a:rPr lang="en-US" b="1" dirty="0">
-                <a:solidFill>
-                  <a:schemeClr val="accent6"/>
-                </a:solidFill>
-              </a:rPr>
-              <a:t>4</a:t>
-            </a:r>
-            <a:r>
-              <a:rPr lang="en-US" b="1" dirty="0"/>
-              <a:t> </a:t>
-            </a:r>
-            <a:r>
-              <a:rPr lang="en-US" dirty="0">
-                <a:solidFill>
-                  <a:schemeClr val="accent2"/>
-                </a:solidFill>
-              </a:rPr>
-              <a:t>|</a:t>
-            </a:r>
-            <a:r>
-              <a:rPr lang="en-US" dirty="0"/>
-              <a:t> Lecture </a:t>
-            </a:r>
-            <a:r>
-              <a:rPr lang="en-US" dirty="0">
-                <a:solidFill>
-                  <a:schemeClr val="accent6"/>
-                </a:solidFill>
-              </a:rPr>
-              <a:t>1 </a:t>
-            </a:r>
-            <a:r>
-              <a:rPr lang="en-US" dirty="0">
-                <a:solidFill>
-                  <a:schemeClr val="accent1"/>
-                </a:solidFill>
-              </a:rPr>
-              <a:t>(</a:t>
-            </a:r>
-            <a:r>
-              <a:rPr lang="en-US" dirty="0">
-                <a:solidFill>
-                  <a:schemeClr val="accent6"/>
-                </a:solidFill>
-              </a:rPr>
-              <a:t>4</a:t>
-            </a:r>
-            <a:r>
-              <a:rPr lang="en-US" dirty="0"/>
-              <a:t>.</a:t>
-            </a:r>
-            <a:r>
-              <a:rPr lang="en-US" dirty="0">
-                <a:solidFill>
-                  <a:schemeClr val="accent6"/>
-                </a:solidFill>
-              </a:rPr>
-              <a:t>1</a:t>
-            </a:r>
-            <a:r>
-              <a:rPr lang="en-US" dirty="0">
-                <a:solidFill>
-                  <a:schemeClr val="accent1"/>
-                </a:solidFill>
-              </a:rPr>
-              <a:t>)</a:t>
+            <a:pPr algn="ctr"/>
+            <a:r>
+              <a:rPr lang="en-US" sz="12000" b="1" dirty="0"/>
+              <a:t>PRACTICE</a:t>
+            </a:r>
+            <a:r>
+              <a:rPr lang="en-US" sz="12000" b="1" dirty="0">
+                <a:solidFill>
+                  <a:srgbClr val="CC99FF"/>
+                </a:solidFill>
+              </a:rPr>
+              <a:t>!</a:t>
             </a:r>
           </a:p>
         </p:txBody>
@@ -53873,7 +53867,7 @@
     </p:spTree>
     <p:extLst>
       <p:ext uri="{BB962C8B-B14F-4D97-AF65-F5344CB8AC3E}">
-        <p14:creationId xmlns:p14="http://schemas.microsoft.com/office/powerpoint/2010/main" val="72351482"/>
+        <p14:creationId xmlns:p14="http://schemas.microsoft.com/office/powerpoint/2010/main" val="577522275"/>
       </p:ext>
     </p:extLst>
   </p:cSld>
@@ -55060,6 +55054,330 @@
     <p:extLst>
       <p:ext uri="{BB962C8B-B14F-4D97-AF65-F5344CB8AC3E}">
         <p14:creationId xmlns:p14="http://schemas.microsoft.com/office/powerpoint/2010/main" val="929351939"/>
+      </p:ext>
+    </p:extLst>
+  </p:cSld>
+  <p:clrMapOvr>
+    <a:masterClrMapping/>
+  </p:clrMapOvr>
+</p:sld>
+</file>
+
+<file path=ppt/slides/slide80.xml><?xml version="1.0" encoding="utf-8"?>
+<p:sld xmlns:a="http://schemas.openxmlformats.org/drawingml/2006/main" xmlns:r="http://schemas.openxmlformats.org/officeDocument/2006/relationships" xmlns:p="http://schemas.openxmlformats.org/presentationml/2006/main">
+  <p:cSld>
+    <p:spTree>
+      <p:nvGrpSpPr>
+        <p:cNvPr id="1" name="">
+          <a:extLst>
+            <a:ext uri="{FF2B5EF4-FFF2-40B4-BE49-F238E27FC236}">
+              <a16:creationId xmlns:a16="http://schemas.microsoft.com/office/drawing/2014/main" id="{89543591-A10E-1DD2-14BD-BAC4948F25BD}"/>
+            </a:ext>
+          </a:extLst>
+        </p:cNvPr>
+        <p:cNvGrpSpPr/>
+        <p:nvPr/>
+      </p:nvGrpSpPr>
+      <p:grpSpPr>
+        <a:xfrm>
+          <a:off x="0" y="0"/>
+          <a:ext cx="0" cy="0"/>
+          <a:chOff x="0" y="0"/>
+          <a:chExt cx="0" cy="0"/>
+        </a:xfrm>
+      </p:grpSpPr>
+      <p:sp>
+        <p:nvSpPr>
+          <p:cNvPr id="2" name="Title 1">
+            <a:extLst>
+              <a:ext uri="{FF2B5EF4-FFF2-40B4-BE49-F238E27FC236}">
+                <a16:creationId xmlns:a16="http://schemas.microsoft.com/office/drawing/2014/main" id="{EC8BA022-DBA5-16EC-EFDC-8BE272A0AF6E}"/>
+              </a:ext>
+            </a:extLst>
+          </p:cNvPr>
+          <p:cNvSpPr>
+            <a:spLocks noGrp="1"/>
+          </p:cNvSpPr>
+          <p:nvPr>
+            <p:ph type="ctrTitle"/>
+          </p:nvPr>
+        </p:nvSpPr>
+        <p:spPr/>
+        <p:txBody>
+          <a:bodyPr>
+            <a:normAutofit/>
+          </a:bodyPr>
+          <a:lstStyle/>
+          <a:p>
+            <a:r>
+              <a:rPr lang="en-US" dirty="0"/>
+              <a:t>while loops</a:t>
+            </a:r>
+            <a:r>
+              <a:rPr lang="en-US" dirty="0">
+                <a:solidFill>
+                  <a:schemeClr val="accent1"/>
+                </a:solidFill>
+              </a:rPr>
+              <a:t>.</a:t>
+            </a:r>
+          </a:p>
+        </p:txBody>
+      </p:sp>
+      <p:sp>
+        <p:nvSpPr>
+          <p:cNvPr id="3" name="Subtitle 2">
+            <a:extLst>
+              <a:ext uri="{FF2B5EF4-FFF2-40B4-BE49-F238E27FC236}">
+                <a16:creationId xmlns:a16="http://schemas.microsoft.com/office/drawing/2014/main" id="{BC9715B6-BF76-F833-63C8-5A82966A68D5}"/>
+              </a:ext>
+            </a:extLst>
+          </p:cNvPr>
+          <p:cNvSpPr>
+            <a:spLocks noGrp="1"/>
+          </p:cNvSpPr>
+          <p:nvPr>
+            <p:ph type="subTitle" idx="1"/>
+          </p:nvPr>
+        </p:nvSpPr>
+        <p:spPr/>
+        <p:txBody>
+          <a:bodyPr/>
+          <a:lstStyle/>
+          <a:p>
+            <a:r>
+              <a:rPr lang="en-US" b="1" dirty="0"/>
+              <a:t>Week </a:t>
+            </a:r>
+            <a:r>
+              <a:rPr lang="en-US" b="1" dirty="0">
+                <a:solidFill>
+                  <a:schemeClr val="accent6"/>
+                </a:solidFill>
+              </a:rPr>
+              <a:t>4</a:t>
+            </a:r>
+            <a:r>
+              <a:rPr lang="en-US" b="1" dirty="0"/>
+              <a:t> </a:t>
+            </a:r>
+            <a:r>
+              <a:rPr lang="en-US" dirty="0">
+                <a:solidFill>
+                  <a:schemeClr val="accent2"/>
+                </a:solidFill>
+              </a:rPr>
+              <a:t>|</a:t>
+            </a:r>
+            <a:r>
+              <a:rPr lang="en-US" dirty="0"/>
+              <a:t> Lecture </a:t>
+            </a:r>
+            <a:r>
+              <a:rPr lang="en-US" dirty="0">
+                <a:solidFill>
+                  <a:schemeClr val="accent6"/>
+                </a:solidFill>
+              </a:rPr>
+              <a:t>1 </a:t>
+            </a:r>
+            <a:r>
+              <a:rPr lang="en-US" dirty="0">
+                <a:solidFill>
+                  <a:schemeClr val="accent1"/>
+                </a:solidFill>
+              </a:rPr>
+              <a:t>(</a:t>
+            </a:r>
+            <a:r>
+              <a:rPr lang="en-US" dirty="0">
+                <a:solidFill>
+                  <a:schemeClr val="accent6"/>
+                </a:solidFill>
+              </a:rPr>
+              <a:t>4</a:t>
+            </a:r>
+            <a:r>
+              <a:rPr lang="en-US" dirty="0"/>
+              <a:t>.</a:t>
+            </a:r>
+            <a:r>
+              <a:rPr lang="en-US" dirty="0">
+                <a:solidFill>
+                  <a:schemeClr val="accent6"/>
+                </a:solidFill>
+              </a:rPr>
+              <a:t>1</a:t>
+            </a:r>
+            <a:r>
+              <a:rPr lang="en-US" dirty="0">
+                <a:solidFill>
+                  <a:schemeClr val="accent1"/>
+                </a:solidFill>
+              </a:rPr>
+              <a:t>)</a:t>
+            </a:r>
+          </a:p>
+        </p:txBody>
+      </p:sp>
+      <p:sp>
+        <p:nvSpPr>
+          <p:cNvPr id="4" name="TextBox 3">
+            <a:extLst>
+              <a:ext uri="{FF2B5EF4-FFF2-40B4-BE49-F238E27FC236}">
+                <a16:creationId xmlns:a16="http://schemas.microsoft.com/office/drawing/2014/main" id="{2B3DD441-B08A-B313-0CA7-8BBFBF27621F}"/>
+              </a:ext>
+            </a:extLst>
+          </p:cNvPr>
+          <p:cNvSpPr txBox="1"/>
+          <p:nvPr/>
+        </p:nvSpPr>
+        <p:spPr>
+          <a:xfrm>
+            <a:off x="335947" y="5102715"/>
+            <a:ext cx="6619392" cy="1323439"/>
+          </a:xfrm>
+          <a:prstGeom prst="rect">
+            <a:avLst/>
+          </a:prstGeom>
+          <a:noFill/>
+        </p:spPr>
+        <p:txBody>
+          <a:bodyPr wrap="square" rtlCol="0">
+            <a:spAutoFit/>
+          </a:bodyPr>
+          <a:lstStyle/>
+          <a:p>
+            <a:r>
+              <a:rPr lang="en-US" sz="1600" b="1" dirty="0">
+                <a:solidFill>
+                  <a:srgbClr val="CC99FF"/>
+                </a:solidFill>
+              </a:rPr>
+              <a:t>Upcoming</a:t>
+            </a:r>
+          </a:p>
+          <a:p>
+            <a:pPr marL="285750" indent="-285750">
+              <a:buClr>
+                <a:srgbClr val="CC99FF"/>
+              </a:buClr>
+              <a:buFont typeface="Wingdings" panose="05000000000000000000" pitchFamily="2" charset="2"/>
+              <a:buChar char="§"/>
+            </a:pPr>
+            <a:r>
+              <a:rPr lang="en-US" sz="1600" dirty="0">
+                <a:solidFill>
+                  <a:srgbClr val="66FF99"/>
+                </a:solidFill>
+              </a:rPr>
+              <a:t>Lab 2 Due 11:59 pm Friday</a:t>
+            </a:r>
+            <a:r>
+              <a:rPr lang="en-US" sz="1600" dirty="0">
+                <a:solidFill>
+                  <a:srgbClr val="CC99FF"/>
+                </a:solidFill>
+              </a:rPr>
+              <a:t>.</a:t>
+            </a:r>
+            <a:endParaRPr lang="en-US" sz="1600" dirty="0">
+              <a:solidFill>
+                <a:srgbClr val="66FF99"/>
+              </a:solidFill>
+            </a:endParaRPr>
+          </a:p>
+          <a:p>
+            <a:pPr marL="285750" indent="-285750">
+              <a:buClr>
+                <a:srgbClr val="CC99FF"/>
+              </a:buClr>
+              <a:buFont typeface="Wingdings" panose="05000000000000000000" pitchFamily="2" charset="2"/>
+              <a:buChar char="§"/>
+            </a:pPr>
+            <a:r>
+              <a:rPr lang="en-US" sz="1600" dirty="0">
+                <a:solidFill>
+                  <a:srgbClr val="66FF99"/>
+                </a:solidFill>
+              </a:rPr>
+              <a:t>No new lab released this Thursday</a:t>
+            </a:r>
+            <a:r>
+              <a:rPr lang="en-US" sz="1600" dirty="0">
+                <a:solidFill>
+                  <a:srgbClr val="CC99FF"/>
+                </a:solidFill>
+              </a:rPr>
+              <a:t>.</a:t>
+            </a:r>
+            <a:endParaRPr lang="en-US" sz="1600" dirty="0">
+              <a:solidFill>
+                <a:srgbClr val="66FF99"/>
+              </a:solidFill>
+            </a:endParaRPr>
+          </a:p>
+          <a:p>
+            <a:pPr marL="285750" indent="-285750">
+              <a:buClr>
+                <a:srgbClr val="CC99FF"/>
+              </a:buClr>
+              <a:buFont typeface="Wingdings" panose="05000000000000000000" pitchFamily="2" charset="2"/>
+              <a:buChar char="§"/>
+            </a:pPr>
+            <a:r>
+              <a:rPr lang="en-US" sz="1600" dirty="0">
+                <a:solidFill>
+                  <a:srgbClr val="66FF99"/>
+                </a:solidFill>
+              </a:rPr>
+              <a:t>Reflection 4 Released Friday 6:00 pm</a:t>
+            </a:r>
+            <a:r>
+              <a:rPr lang="en-US" sz="1600" dirty="0">
+                <a:solidFill>
+                  <a:srgbClr val="CC99FF"/>
+                </a:solidFill>
+              </a:rPr>
+              <a:t>.</a:t>
+            </a:r>
+            <a:endParaRPr lang="en-US" sz="1600" dirty="0">
+              <a:solidFill>
+                <a:srgbClr val="66FF99"/>
+              </a:solidFill>
+            </a:endParaRPr>
+          </a:p>
+          <a:p>
+            <a:pPr marL="285750" indent="-285750">
+              <a:buClr>
+                <a:srgbClr val="CC99FF"/>
+              </a:buClr>
+              <a:buFont typeface="Wingdings" panose="05000000000000000000" pitchFamily="2" charset="2"/>
+              <a:buChar char="§"/>
+            </a:pPr>
+            <a:r>
+              <a:rPr lang="en-US" sz="1600" dirty="0">
+                <a:solidFill>
+                  <a:srgbClr val="66FF99"/>
+                </a:solidFill>
+              </a:rPr>
+              <a:t>Tutorial (Online), Practical, Office Hour sessions running all week</a:t>
+            </a:r>
+            <a:r>
+              <a:rPr lang="en-US" sz="1600" dirty="0">
+                <a:solidFill>
+                  <a:srgbClr val="CC99FF"/>
+                </a:solidFill>
+              </a:rPr>
+              <a:t>.</a:t>
+            </a:r>
+          </a:p>
+        </p:txBody>
+      </p:sp>
+    </p:spTree>
+    <p:extLst>
+      <p:ext uri="{BB962C8B-B14F-4D97-AF65-F5344CB8AC3E}">
+        <p14:creationId xmlns:p14="http://schemas.microsoft.com/office/powerpoint/2010/main" val="3750289960"/>
       </p:ext>
     </p:extLst>
   </p:cSld>

</xml_diff>

<commit_message>
- Week 4 Lecture 2
</commit_message>
<xml_diff>
--- a/lectures/week4/lecture1/slides/week4_lecture1.pptx
+++ b/lectures/week4/lecture1/slides/week4_lecture1.pptx
@@ -9847,9 +9847,10 @@
           <a:p>
             <a:pPr lvl="1"/>
             <a:r>
-              <a:rPr lang="en-US" dirty="0"/>
-              <a:t>Design Problem: Cryptography</a:t>
-            </a:r>
+              <a:rPr lang="en-US"/>
+              <a:t>Objects &amp; Strings: Operators and Methods</a:t>
+            </a:r>
+            <a:endParaRPr lang="en-US" dirty="0"/>
           </a:p>
         </p:txBody>
       </p:sp>

</xml_diff>